<commit_message>
Change result order of W-L-D to W-D-L
</commit_message>
<xml_diff>
--- a/PresentatieAI.pptx
+++ b/PresentatieAI.pptx
@@ -5977,12 +5977,8 @@
               <a:buChar char="•"/>
             </a:pPr>
             <a:r>
-              <a:rPr lang="nl-BE" dirty="0" err="1"/>
-              <a:t>Loss</a:t>
-            </a:r>
-            <a:r>
-              <a:rPr lang="nl-BE" dirty="0"/>
-              <a:t>: 1</a:t>
+              <a:rPr lang="nl-BE" dirty="0"/>
+              <a:t>Draw: 0</a:t>
             </a:r>
           </a:p>
           <a:p>
@@ -5991,8 +5987,12 @@
               <a:buChar char="•"/>
             </a:pPr>
             <a:r>
-              <a:rPr lang="nl-BE" dirty="0"/>
-              <a:t>Draw: 0</a:t>
+              <a:rPr lang="nl-BE" dirty="0" err="1"/>
+              <a:t>Loss</a:t>
+            </a:r>
+            <a:r>
+              <a:rPr lang="nl-BE" dirty="0"/>
+              <a:t>: 1</a:t>
             </a:r>
           </a:p>
           <a:p>
@@ -6030,12 +6030,8 @@
               <a:buChar char="•"/>
             </a:pPr>
             <a:r>
-              <a:rPr lang="nl-BE" dirty="0" err="1"/>
-              <a:t>Loss</a:t>
-            </a:r>
-            <a:r>
-              <a:rPr lang="nl-BE" dirty="0"/>
-              <a:t>: 3</a:t>
+              <a:rPr lang="nl-BE" dirty="0"/>
+              <a:t>Draw: 1</a:t>
             </a:r>
           </a:p>
           <a:p>
@@ -6044,8 +6040,12 @@
               <a:buChar char="•"/>
             </a:pPr>
             <a:r>
-              <a:rPr lang="nl-BE" dirty="0"/>
-              <a:t>Draw:1</a:t>
+              <a:rPr lang="nl-BE" dirty="0" err="1"/>
+              <a:t>Loss</a:t>
+            </a:r>
+            <a:r>
+              <a:rPr lang="nl-BE" dirty="0"/>
+              <a:t>: 3</a:t>
             </a:r>
           </a:p>
           <a:p>
@@ -6273,12 +6273,8 @@
               <a:buChar char="•"/>
             </a:pPr>
             <a:r>
-              <a:rPr lang="nl-BE" dirty="0" err="1"/>
-              <a:t>Loss</a:t>
-            </a:r>
-            <a:r>
-              <a:rPr lang="nl-BE" dirty="0"/>
-              <a:t>: 0</a:t>
+              <a:rPr lang="nl-BE" dirty="0"/>
+              <a:t>Draw: 5</a:t>
             </a:r>
           </a:p>
           <a:p>
@@ -6287,8 +6283,12 @@
               <a:buChar char="•"/>
             </a:pPr>
             <a:r>
-              <a:rPr lang="nl-BE" dirty="0"/>
-              <a:t>Draw: 5</a:t>
+              <a:rPr lang="nl-BE" dirty="0" err="1"/>
+              <a:t>Loss</a:t>
+            </a:r>
+            <a:r>
+              <a:rPr lang="nl-BE" dirty="0"/>
+              <a:t>: 0</a:t>
             </a:r>
           </a:p>
           <a:p>
@@ -6326,12 +6326,8 @@
               <a:buChar char="•"/>
             </a:pPr>
             <a:r>
-              <a:rPr lang="nl-BE" dirty="0" err="1"/>
-              <a:t>Loss</a:t>
-            </a:r>
-            <a:r>
-              <a:rPr lang="nl-BE" dirty="0"/>
-              <a:t>: 4</a:t>
+              <a:rPr lang="nl-BE" dirty="0"/>
+              <a:t>Draw: 2</a:t>
             </a:r>
           </a:p>
           <a:p>
@@ -6340,16 +6336,13 @@
               <a:buChar char="•"/>
             </a:pPr>
             <a:r>
-              <a:rPr lang="nl-BE" dirty="0"/>
-              <a:t>Draw:2</a:t>
-            </a:r>
-          </a:p>
-          <a:p>
-            <a:pPr marL="457200" indent="-457200">
-              <a:buFont typeface="Arial" panose="020B0604020202020204" pitchFamily="34" charset="0"/>
-              <a:buChar char="•"/>
-            </a:pPr>
-            <a:endParaRPr lang="nl-BE" dirty="0"/>
+              <a:rPr lang="nl-BE" dirty="0" err="1"/>
+              <a:t>Loss</a:t>
+            </a:r>
+            <a:r>
+              <a:rPr lang="nl-BE" dirty="0"/>
+              <a:t>: 4</a:t>
+            </a:r>
           </a:p>
         </p:txBody>
       </p:sp>
@@ -6547,12 +6540,8 @@
               <a:buChar char="•"/>
             </a:pPr>
             <a:r>
-              <a:rPr lang="nl-BE" dirty="0" err="1"/>
-              <a:t>Loss</a:t>
-            </a:r>
-            <a:r>
-              <a:rPr lang="nl-BE" dirty="0"/>
-              <a:t>: 1</a:t>
+              <a:rPr lang="nl-BE" dirty="0"/>
+              <a:t>Draw: 3</a:t>
             </a:r>
           </a:p>
           <a:p>
@@ -6561,8 +6550,12 @@
               <a:buChar char="•"/>
             </a:pPr>
             <a:r>
-              <a:rPr lang="nl-BE" dirty="0"/>
-              <a:t>Draw: 3</a:t>
+              <a:rPr lang="nl-BE" dirty="0" err="1"/>
+              <a:t>Loss</a:t>
+            </a:r>
+            <a:r>
+              <a:rPr lang="nl-BE" dirty="0"/>
+              <a:t>: 1</a:t>
             </a:r>
           </a:p>
           <a:p>
@@ -6600,12 +6593,8 @@
               <a:buChar char="•"/>
             </a:pPr>
             <a:r>
-              <a:rPr lang="nl-BE" dirty="0" err="1"/>
-              <a:t>Loss</a:t>
-            </a:r>
-            <a:r>
-              <a:rPr lang="nl-BE" dirty="0"/>
-              <a:t>: 6</a:t>
+              <a:rPr lang="nl-BE" dirty="0"/>
+              <a:t>Draw: 8</a:t>
             </a:r>
           </a:p>
           <a:p>
@@ -6614,12 +6603,13 @@
               <a:buChar char="•"/>
             </a:pPr>
             <a:r>
-              <a:rPr lang="nl-BE" dirty="0"/>
-              <a:t>Draw:8</a:t>
-            </a:r>
-          </a:p>
-          <a:p>
-            <a:endParaRPr lang="nl-BE" dirty="0"/>
+              <a:rPr lang="nl-BE" dirty="0" err="1"/>
+              <a:t>Loss</a:t>
+            </a:r>
+            <a:r>
+              <a:rPr lang="nl-BE" dirty="0"/>
+              <a:t>: 6</a:t>
+            </a:r>
           </a:p>
         </p:txBody>
       </p:sp>

</xml_diff>

<commit_message>
aanpassing ppt (draw in het midden)
</commit_message>
<xml_diff>
--- a/PresentatieAI.pptx
+++ b/PresentatieAI.pptx
@@ -5977,12 +5977,8 @@
               <a:buChar char="•"/>
             </a:pPr>
             <a:r>
-              <a:rPr lang="nl-BE" dirty="0" err="1"/>
-              <a:t>Loss</a:t>
-            </a:r>
-            <a:r>
-              <a:rPr lang="nl-BE" dirty="0"/>
-              <a:t>: 1</a:t>
+              <a:rPr lang="nl-BE" dirty="0"/>
+              <a:t>Draw: 0</a:t>
             </a:r>
           </a:p>
           <a:p>
@@ -5991,8 +5987,12 @@
               <a:buChar char="•"/>
             </a:pPr>
             <a:r>
-              <a:rPr lang="nl-BE" dirty="0"/>
-              <a:t>Draw: 0</a:t>
+              <a:rPr lang="nl-BE" dirty="0" err="1"/>
+              <a:t>Loss</a:t>
+            </a:r>
+            <a:r>
+              <a:rPr lang="nl-BE" dirty="0"/>
+              <a:t>: 1</a:t>
             </a:r>
           </a:p>
           <a:p>
@@ -6030,12 +6030,8 @@
               <a:buChar char="•"/>
             </a:pPr>
             <a:r>
-              <a:rPr lang="nl-BE" dirty="0" err="1"/>
-              <a:t>Loss</a:t>
-            </a:r>
-            <a:r>
-              <a:rPr lang="nl-BE" dirty="0"/>
-              <a:t>: 3</a:t>
+              <a:rPr lang="nl-BE" dirty="0"/>
+              <a:t>Draw:1</a:t>
             </a:r>
           </a:p>
           <a:p>
@@ -6044,8 +6040,12 @@
               <a:buChar char="•"/>
             </a:pPr>
             <a:r>
-              <a:rPr lang="nl-BE" dirty="0"/>
-              <a:t>Draw:1</a:t>
+              <a:rPr lang="nl-BE" dirty="0" err="1"/>
+              <a:t>Loss</a:t>
+            </a:r>
+            <a:r>
+              <a:rPr lang="nl-BE" dirty="0"/>
+              <a:t>: 3</a:t>
             </a:r>
           </a:p>
           <a:p>
@@ -6273,12 +6273,8 @@
               <a:buChar char="•"/>
             </a:pPr>
             <a:r>
-              <a:rPr lang="nl-BE" dirty="0" err="1"/>
-              <a:t>Loss</a:t>
-            </a:r>
-            <a:r>
-              <a:rPr lang="nl-BE" dirty="0"/>
-              <a:t>: 0</a:t>
+              <a:rPr lang="nl-BE" dirty="0"/>
+              <a:t>Draw: 5</a:t>
             </a:r>
           </a:p>
           <a:p>
@@ -6287,8 +6283,12 @@
               <a:buChar char="•"/>
             </a:pPr>
             <a:r>
-              <a:rPr lang="nl-BE" dirty="0"/>
-              <a:t>Draw: 5</a:t>
+              <a:rPr lang="nl-BE" dirty="0" err="1"/>
+              <a:t>Loss</a:t>
+            </a:r>
+            <a:r>
+              <a:rPr lang="nl-BE" dirty="0"/>
+              <a:t>: 0</a:t>
             </a:r>
           </a:p>
           <a:p>
@@ -6326,12 +6326,8 @@
               <a:buChar char="•"/>
             </a:pPr>
             <a:r>
-              <a:rPr lang="nl-BE" dirty="0" err="1"/>
-              <a:t>Loss</a:t>
-            </a:r>
-            <a:r>
-              <a:rPr lang="nl-BE" dirty="0"/>
-              <a:t>: 4</a:t>
+              <a:rPr lang="nl-BE" dirty="0"/>
+              <a:t>Draw:2</a:t>
             </a:r>
           </a:p>
           <a:p>
@@ -6340,8 +6336,12 @@
               <a:buChar char="•"/>
             </a:pPr>
             <a:r>
-              <a:rPr lang="nl-BE" dirty="0"/>
-              <a:t>Draw:2</a:t>
+              <a:rPr lang="nl-BE" dirty="0" err="1"/>
+              <a:t>Loss</a:t>
+            </a:r>
+            <a:r>
+              <a:rPr lang="nl-BE" dirty="0"/>
+              <a:t>: 4</a:t>
             </a:r>
           </a:p>
           <a:p>
@@ -6547,12 +6547,8 @@
               <a:buChar char="•"/>
             </a:pPr>
             <a:r>
-              <a:rPr lang="nl-BE" dirty="0" err="1"/>
-              <a:t>Loss</a:t>
-            </a:r>
-            <a:r>
-              <a:rPr lang="nl-BE" dirty="0"/>
-              <a:t>: 1</a:t>
+              <a:rPr lang="nl-BE" dirty="0"/>
+              <a:t>Draw: 3</a:t>
             </a:r>
           </a:p>
           <a:p>
@@ -6561,8 +6557,12 @@
               <a:buChar char="•"/>
             </a:pPr>
             <a:r>
-              <a:rPr lang="nl-BE" dirty="0"/>
-              <a:t>Draw: 3</a:t>
+              <a:rPr lang="nl-BE" dirty="0" err="1"/>
+              <a:t>Loss</a:t>
+            </a:r>
+            <a:r>
+              <a:rPr lang="nl-BE" dirty="0"/>
+              <a:t>: 1</a:t>
             </a:r>
           </a:p>
           <a:p>
@@ -6600,12 +6600,8 @@
               <a:buChar char="•"/>
             </a:pPr>
             <a:r>
-              <a:rPr lang="nl-BE" dirty="0" err="1"/>
-              <a:t>Loss</a:t>
-            </a:r>
-            <a:r>
-              <a:rPr lang="nl-BE" dirty="0"/>
-              <a:t>: 6</a:t>
+              <a:rPr lang="nl-BE" dirty="0"/>
+              <a:t>Draw:8</a:t>
             </a:r>
           </a:p>
           <a:p>
@@ -6614,8 +6610,12 @@
               <a:buChar char="•"/>
             </a:pPr>
             <a:r>
-              <a:rPr lang="nl-BE" dirty="0"/>
-              <a:t>Draw:8</a:t>
+              <a:rPr lang="nl-BE" dirty="0" err="1"/>
+              <a:t>Loss</a:t>
+            </a:r>
+            <a:r>
+              <a:rPr lang="nl-BE" dirty="0"/>
+              <a:t>: 6</a:t>
             </a:r>
           </a:p>
           <a:p>

</xml_diff>

<commit_message>
Add latest ppt changes
</commit_message>
<xml_diff>
--- a/PresentatieAI.pptx
+++ b/PresentatieAI.pptx
@@ -266,7 +266,7 @@
             <a:fld id="{78C30D92-9D29-4B80-B01C-A254EB54E9B4}" type="datetimeFigureOut">
               <a:rPr lang="nl-BE" smtClean="0"/>
               <a:pPr/>
-              <a:t>6/01/2020</a:t>
+              <a:t>7/01/2020</a:t>
             </a:fld>
             <a:endParaRPr lang="nl-BE"/>
           </a:p>
@@ -433,7 +433,7 @@
             <a:fld id="{09E7BB96-5CC4-4FBA-B6DA-4C0FA69C8B55}" type="datetimeFigureOut">
               <a:rPr lang="nl-NL" smtClean="0"/>
               <a:pPr/>
-              <a:t>6-1-2020</a:t>
+              <a:t>7-1-2020</a:t>
             </a:fld>
             <a:endParaRPr lang="nl-NL"/>
           </a:p>
@@ -1066,7 +1066,7 @@
             <a:fld id="{8FF760A7-6202-4C5B-B798-73425609F823}" type="datetime1">
               <a:rPr lang="nl-NL" smtClean="0"/>
               <a:pPr/>
-              <a:t>6-1-2020</a:t>
+              <a:t>7-1-2020</a:t>
             </a:fld>
             <a:endParaRPr lang="nl-NL"/>
           </a:p>
@@ -1281,7 +1281,7 @@
             <a:fld id="{8FF760A7-6202-4C5B-B798-73425609F823}" type="datetime1">
               <a:rPr lang="nl-NL" smtClean="0"/>
               <a:pPr/>
-              <a:t>6-1-2020</a:t>
+              <a:t>7-1-2020</a:t>
             </a:fld>
             <a:endParaRPr lang="nl-NL"/>
           </a:p>
@@ -1734,7 +1734,7 @@
             <a:fld id="{8FF760A7-6202-4C5B-B798-73425609F823}" type="datetime1">
               <a:rPr lang="nl-NL" smtClean="0"/>
               <a:pPr/>
-              <a:t>6-1-2020</a:t>
+              <a:t>7-1-2020</a:t>
             </a:fld>
             <a:endParaRPr lang="nl-NL"/>
           </a:p>
@@ -2561,7 +2561,7 @@
             <a:fld id="{F1646035-8169-445B-99AD-38F647E173A8}" type="datetime1">
               <a:rPr lang="nl-NL" smtClean="0"/>
               <a:pPr/>
-              <a:t>6-1-2020</a:t>
+              <a:t>7-1-2020</a:t>
             </a:fld>
             <a:endParaRPr lang="nl-NL"/>
           </a:p>
@@ -2782,7 +2782,7 @@
             <a:fld id="{3700EDBC-F276-4708-BB2C-8BF9B9604881}" type="datetime1">
               <a:rPr lang="nl-NL" smtClean="0"/>
               <a:pPr/>
-              <a:t>6-1-2020</a:t>
+              <a:t>7-1-2020</a:t>
             </a:fld>
             <a:endParaRPr lang="nl-NL" dirty="0"/>
           </a:p>
@@ -3102,7 +3102,7 @@
             <a:fld id="{3EDC4772-17F8-4E3A-83E4-CBDF682CE967}" type="datetime1">
               <a:rPr lang="nl-NL" smtClean="0"/>
               <a:pPr/>
-              <a:t>6-1-2020</a:t>
+              <a:t>7-1-2020</a:t>
             </a:fld>
             <a:endParaRPr lang="nl-NL"/>
           </a:p>
@@ -3570,7 +3570,7 @@
             <a:fld id="{F898F2F8-F7C6-4601-B5D1-4C666ED97577}" type="datetime1">
               <a:rPr lang="nl-NL" smtClean="0"/>
               <a:pPr/>
-              <a:t>6-1-2020</a:t>
+              <a:t>7-1-2020</a:t>
             </a:fld>
             <a:endParaRPr lang="nl-NL"/>
           </a:p>
@@ -3722,7 +3722,7 @@
             <a:fld id="{809AF28B-E245-4898-8A0D-E2E4E58A61F0}" type="datetime1">
               <a:rPr lang="nl-NL" smtClean="0"/>
               <a:pPr/>
-              <a:t>6-1-2020</a:t>
+              <a:t>7-1-2020</a:t>
             </a:fld>
             <a:endParaRPr lang="nl-NL"/>
           </a:p>
@@ -3852,7 +3852,7 @@
             <a:fld id="{0ED09C64-F411-4FDC-96AD-EC98B445DDC5}" type="datetime1">
               <a:rPr lang="nl-NL" smtClean="0"/>
               <a:pPr/>
-              <a:t>6-1-2020</a:t>
+              <a:t>7-1-2020</a:t>
             </a:fld>
             <a:endParaRPr lang="nl-NL"/>
           </a:p>
@@ -4086,7 +4086,7 @@
             <a:fld id="{B71E2D7C-B77E-48FB-B6F1-3640447F226A}" type="datetime1">
               <a:rPr lang="nl-NL" smtClean="0"/>
               <a:pPr/>
-              <a:t>6-1-2020</a:t>
+              <a:t>7-1-2020</a:t>
             </a:fld>
             <a:endParaRPr lang="nl-NL"/>
           </a:p>
@@ -4332,7 +4332,7 @@
             <a:fld id="{D4F06C36-30E3-4EC4-970C-BDB2513E3A51}" type="datetime1">
               <a:rPr lang="nl-NL" smtClean="0"/>
               <a:pPr/>
-              <a:t>6-1-2020</a:t>
+              <a:t>7-1-2020</a:t>
             </a:fld>
             <a:endParaRPr lang="nl-NL" dirty="0"/>
           </a:p>
@@ -8618,7 +8618,7 @@
             </a:r>
             <a:r>
               <a:rPr lang="nl-BE" dirty="0"/>
-              <a:t>: waarde van board ‘voorspellen’</a:t>
+              <a:t>: waarde van board voorspellen</a:t>
             </a:r>
           </a:p>
           <a:p>

</xml_diff>